<commit_message>
add expressions to variables content
</commit_message>
<xml_diff>
--- a/static/courses/115Slides/1-Expressions.pptx
+++ b/static/courses/115Slides/1-Expressions.pptx
@@ -200,7 +200,7 @@
           <a:p>
             <a:fld id="{E43CAD67-EA07-6E43-B513-90AD5AC9B4AC}" type="datetimeFigureOut">
               <a:rPr lang="en-US" smtClean="0"/>
-              <a:t>1/31/17</a:t>
+              <a:t>2/2/17</a:t>
             </a:fld>
             <a:endParaRPr lang="en-US"/>
           </a:p>
@@ -649,7 +649,7 @@
           <a:p>
             <a:fld id="{37294231-DEF7-9C44-8263-6D85FFAC3F1A}" type="datetimeFigureOut">
               <a:rPr lang="en-US" smtClean="0"/>
-              <a:t>1/31/17</a:t>
+              <a:t>2/2/17</a:t>
             </a:fld>
             <a:endParaRPr lang="en-US"/>
           </a:p>
@@ -819,7 +819,7 @@
           <a:p>
             <a:fld id="{37294231-DEF7-9C44-8263-6D85FFAC3F1A}" type="datetimeFigureOut">
               <a:rPr lang="en-US" smtClean="0"/>
-              <a:t>1/31/17</a:t>
+              <a:t>2/2/17</a:t>
             </a:fld>
             <a:endParaRPr lang="en-US"/>
           </a:p>
@@ -999,7 +999,7 @@
           <a:p>
             <a:fld id="{37294231-DEF7-9C44-8263-6D85FFAC3F1A}" type="datetimeFigureOut">
               <a:rPr lang="en-US" smtClean="0"/>
-              <a:t>1/31/17</a:t>
+              <a:t>2/2/17</a:t>
             </a:fld>
             <a:endParaRPr lang="en-US"/>
           </a:p>
@@ -1169,7 +1169,7 @@
           <a:p>
             <a:fld id="{37294231-DEF7-9C44-8263-6D85FFAC3F1A}" type="datetimeFigureOut">
               <a:rPr lang="en-US" smtClean="0"/>
-              <a:t>1/31/17</a:t>
+              <a:t>2/2/17</a:t>
             </a:fld>
             <a:endParaRPr lang="en-US"/>
           </a:p>
@@ -1415,7 +1415,7 @@
           <a:p>
             <a:fld id="{37294231-DEF7-9C44-8263-6D85FFAC3F1A}" type="datetimeFigureOut">
               <a:rPr lang="en-US" smtClean="0"/>
-              <a:t>1/31/17</a:t>
+              <a:t>2/2/17</a:t>
             </a:fld>
             <a:endParaRPr lang="en-US"/>
           </a:p>
@@ -1703,7 +1703,7 @@
           <a:p>
             <a:fld id="{37294231-DEF7-9C44-8263-6D85FFAC3F1A}" type="datetimeFigureOut">
               <a:rPr lang="en-US" smtClean="0"/>
-              <a:t>1/31/17</a:t>
+              <a:t>2/2/17</a:t>
             </a:fld>
             <a:endParaRPr lang="en-US"/>
           </a:p>
@@ -2125,7 +2125,7 @@
           <a:p>
             <a:fld id="{37294231-DEF7-9C44-8263-6D85FFAC3F1A}" type="datetimeFigureOut">
               <a:rPr lang="en-US" smtClean="0"/>
-              <a:t>1/31/17</a:t>
+              <a:t>2/2/17</a:t>
             </a:fld>
             <a:endParaRPr lang="en-US"/>
           </a:p>
@@ -2243,7 +2243,7 @@
           <a:p>
             <a:fld id="{37294231-DEF7-9C44-8263-6D85FFAC3F1A}" type="datetimeFigureOut">
               <a:rPr lang="en-US" smtClean="0"/>
-              <a:t>1/31/17</a:t>
+              <a:t>2/2/17</a:t>
             </a:fld>
             <a:endParaRPr lang="en-US"/>
           </a:p>
@@ -2338,7 +2338,7 @@
           <a:p>
             <a:fld id="{37294231-DEF7-9C44-8263-6D85FFAC3F1A}" type="datetimeFigureOut">
               <a:rPr lang="en-US" smtClean="0"/>
-              <a:t>1/31/17</a:t>
+              <a:t>2/2/17</a:t>
             </a:fld>
             <a:endParaRPr lang="en-US"/>
           </a:p>
@@ -2615,7 +2615,7 @@
           <a:p>
             <a:fld id="{37294231-DEF7-9C44-8263-6D85FFAC3F1A}" type="datetimeFigureOut">
               <a:rPr lang="en-US" smtClean="0"/>
-              <a:t>1/31/17</a:t>
+              <a:t>2/2/17</a:t>
             </a:fld>
             <a:endParaRPr lang="en-US"/>
           </a:p>
@@ -2872,7 +2872,7 @@
           <a:p>
             <a:fld id="{37294231-DEF7-9C44-8263-6D85FFAC3F1A}" type="datetimeFigureOut">
               <a:rPr lang="en-US" smtClean="0"/>
-              <a:t>1/31/17</a:t>
+              <a:t>2/2/17</a:t>
             </a:fld>
             <a:endParaRPr lang="en-US"/>
           </a:p>
@@ -3085,7 +3085,7 @@
           <a:p>
             <a:fld id="{37294231-DEF7-9C44-8263-6D85FFAC3F1A}" type="datetimeFigureOut">
               <a:rPr lang="en-US" smtClean="0"/>
-              <a:t>1/31/17</a:t>
+              <a:t>2/2/17</a:t>
             </a:fld>
             <a:endParaRPr lang="en-US"/>
           </a:p>
@@ -3539,10 +3539,6 @@
           </a:bodyPr>
           <a:lstStyle/>
           <a:p>
-            <a:r>
-              <a:rPr lang="en-US" sz="6000" dirty="0" smtClean="0"/>
-              <a:t>why?</a:t>
-            </a:r>
             <a:endParaRPr lang="en-US" sz="6000" dirty="0"/>
           </a:p>
         </p:txBody>
@@ -3572,7 +3568,7 @@
               <a:buNone/>
             </a:pPr>
             <a:r>
-              <a:rPr lang="en-US" dirty="0" smtClean="0"/>
+              <a:rPr lang="en-US" sz="3600" dirty="0" smtClean="0"/>
               <a:t>Values can change</a:t>
             </a:r>
           </a:p>
@@ -3635,10 +3631,6 @@
           </a:bodyPr>
           <a:lstStyle/>
           <a:p>
-            <a:r>
-              <a:rPr lang="en-US" sz="6000" dirty="0" smtClean="0"/>
-              <a:t>why?</a:t>
-            </a:r>
             <a:endParaRPr lang="en-US" sz="6000" dirty="0"/>
           </a:p>
         </p:txBody>
@@ -3669,7 +3661,15 @@
             </a:pPr>
             <a:r>
               <a:rPr lang="en-US" dirty="0" smtClean="0"/>
-              <a:t>Want to remember the EUR-USD exchange rate</a:t>
+              <a:t>Want to remember the </a:t>
+            </a:r>
+            <a:r>
+              <a:rPr lang="en-US" dirty="0"/>
+              <a:t>USD-EUR </a:t>
+            </a:r>
+            <a:r>
+              <a:rPr lang="en-US" dirty="0" smtClean="0"/>
+              <a:t>exchange rate</a:t>
             </a:r>
           </a:p>
           <a:p>
@@ -3731,10 +3731,6 @@
           </a:bodyPr>
           <a:lstStyle/>
           <a:p>
-            <a:r>
-              <a:rPr lang="en-US" sz="6000" dirty="0" smtClean="0"/>
-              <a:t>why?</a:t>
-            </a:r>
             <a:endParaRPr lang="en-US" sz="6000" dirty="0"/>
           </a:p>
         </p:txBody>
@@ -3964,10 +3960,6 @@
           </a:bodyPr>
           <a:lstStyle/>
           <a:p>
-            <a:r>
-              <a:rPr lang="en-US" sz="6000" dirty="0" smtClean="0"/>
-              <a:t>how?</a:t>
-            </a:r>
             <a:endParaRPr lang="en-US" sz="6000" dirty="0"/>
           </a:p>
         </p:txBody>
@@ -4240,10 +4232,6 @@
           </a:bodyPr>
           <a:lstStyle/>
           <a:p>
-            <a:r>
-              <a:rPr lang="en-US" sz="6000" dirty="0" smtClean="0"/>
-              <a:t>how?</a:t>
-            </a:r>
             <a:endParaRPr lang="en-US" sz="6000" dirty="0"/>
           </a:p>
         </p:txBody>
@@ -4683,10 +4671,6 @@
           </a:bodyPr>
           <a:lstStyle/>
           <a:p>
-            <a:r>
-              <a:rPr lang="en-US" sz="6000" dirty="0" smtClean="0"/>
-              <a:t>how?</a:t>
-            </a:r>
             <a:endParaRPr lang="en-US" sz="6000" dirty="0"/>
           </a:p>
         </p:txBody>

</xml_diff>